<commit_message>
Updated new versions of some files
</commit_message>
<xml_diff>
--- a/MLSec_Bello_S_Project.pptx
+++ b/MLSec_Bello_S_Project.pptx
@@ -4478,7 +4478,7 @@
           <p:nvPr>
             <p:extLst>
               <p:ext uri="{D42A27DB-BD31-4B8C-83A1-F6EECF244321}">
-                <p14:modId xmlns:p14="http://schemas.microsoft.com/office/powerpoint/2010/main" val="3079167343"/>
+                <p14:modId xmlns:p14="http://schemas.microsoft.com/office/powerpoint/2010/main" val="2263588755"/>
               </p:ext>
             </p:extLst>
           </p:nvPr>
@@ -4571,7 +4571,16 @@
                     <a:bodyPr/>
                     <a:lstStyle/>
                     <a:p>
-                      <a:endParaRPr lang="en-GB" sz="2400" noProof="0" dirty="0"/>
+                      <a:r>
+                        <a:rPr lang="en-GB" sz="2000" noProof="0" dirty="0">
+                          <a:hlinkClick r:id="rId2"/>
+                        </a:rPr>
+                        <a:t>https://github.com/s-bello10/MLSec_Bello_S</a:t>
+                      </a:r>
+                      <a:r>
+                        <a:rPr lang="en-GB" sz="2000" noProof="0" dirty="0"/>
+                        <a:t> </a:t>
+                      </a:r>
                     </a:p>
                   </a:txBody>
                   <a:tcPr/>

</xml_diff>